<commit_message>
Audio recorded - Matey
</commit_message>
<xml_diff>
--- a/Assignment 7 - California Housing.pptx
+++ b/Assignment 7 - California Housing.pptx
@@ -817,10 +817,10 @@
               <a:buNone/>
             </a:pPr>
             <a:r>
-              <a:rPr lang="en"/>
-              <a:t>(Matey)</a:t>
+              <a:rPr lang="en" dirty="0"/>
+              <a:t>Welcome to the presentation of last machine learning assignment. The topic picked by the group is the california housing dataset.</a:t>
             </a:r>
-            <a:endParaRPr/>
+            <a:endParaRPr dirty="0"/>
           </a:p>
         </p:txBody>
       </p:sp>
@@ -861,7 +861,7 @@
         </p:nvSpPr>
         <p:spPr>
           <a:xfrm>
-            <a:off x="381300" y="685800"/>
+            <a:off x="381000" y="685800"/>
             <a:ext cx="6096000" cy="3429000"/>
           </a:xfrm>
           <a:custGeom>
@@ -925,10 +925,10 @@
               <a:buNone/>
             </a:pPr>
             <a:r>
-              <a:rPr lang="en"/>
-              <a:t>(Matey)</a:t>
+              <a:rPr lang="en" dirty="0"/>
+              <a:t>Agenda is : </a:t>
             </a:r>
-            <a:endParaRPr/>
+            <a:endParaRPr dirty="0"/>
           </a:p>
         </p:txBody>
       </p:sp>
@@ -969,7 +969,7 @@
         </p:nvSpPr>
         <p:spPr>
           <a:xfrm>
-            <a:off x="381300" y="685800"/>
+            <a:off x="381000" y="685800"/>
             <a:ext cx="6096000" cy="3429000"/>
           </a:xfrm>
           <a:custGeom>
@@ -1032,11 +1032,7 @@
               </a:spcAft>
               <a:buNone/>
             </a:pPr>
-            <a:r>
-              <a:rPr lang="en"/>
-              <a:t>(Matey)</a:t>
-            </a:r>
-            <a:endParaRPr/>
+            <a:endParaRPr dirty="0"/>
           </a:p>
         </p:txBody>
       </p:sp>
@@ -1077,7 +1073,7 @@
         </p:nvSpPr>
         <p:spPr>
           <a:xfrm>
-            <a:off x="381300" y="685800"/>
+            <a:off x="381000" y="685800"/>
             <a:ext cx="6096000" cy="3429000"/>
           </a:xfrm>
           <a:custGeom>
@@ -1141,10 +1137,18 @@
               <a:buNone/>
             </a:pPr>
             <a:r>
-              <a:rPr lang="en"/>
-              <a:t>(Matey) - now I give the word to ..</a:t>
+              <a:rPr lang="en" dirty="0"/>
+              <a:t>(Matey) – To have better understanding of the big picutre better we frame </a:t>
             </a:r>
-            <a:endParaRPr/>
+            <a:r>
+              <a:rPr lang="en-GB" dirty="0" err="1"/>
+              <a:t>th</a:t>
+            </a:r>
+            <a:r>
+              <a:rPr lang="en" dirty="0"/>
+              <a:t>e problem and measure the performance of models.</a:t>
+            </a:r>
+            <a:endParaRPr dirty="0"/>
           </a:p>
         </p:txBody>
       </p:sp>
@@ -1248,7 +1252,7 @@
               </a:spcAft>
               <a:buNone/>
             </a:pPr>
-            <a:endParaRPr/>
+            <a:endParaRPr dirty="0"/>
           </a:p>
         </p:txBody>
       </p:sp>
@@ -1289,7 +1293,7 @@
         </p:nvSpPr>
         <p:spPr>
           <a:xfrm>
-            <a:off x="381300" y="685800"/>
+            <a:off x="381000" y="685800"/>
             <a:ext cx="6096000" cy="3429000"/>
           </a:xfrm>
           <a:custGeom>
@@ -1353,7 +1357,7 @@
               <a:buNone/>
             </a:pPr>
             <a:r>
-              <a:rPr lang="en" sz="1200">
+              <a:rPr lang="en-GB" sz="1200" dirty="0">
                 <a:solidFill>
                   <a:srgbClr val="D1D5DB"/>
                 </a:solidFill>
@@ -1365,9 +1369,76 @@
                 <a:cs typeface="Roboto"/>
                 <a:sym typeface="Roboto"/>
               </a:rPr>
-              <a:t>It sounds like the cleaning and preprocessing of the data was successful, as well as the implementation of normality tests and scaling of features. However, it appears that some of the models are overfitting, which means they are performing well on the training data but not as well on new or unseen data. This can happen when a model is too complex and has too many parameters, which can cause it to memorize the training data instead of learning the underlying patterns. To address this issue, you could try using regularization techniques to reduce overfitting, such as adding a penalty term to the loss function or using early stopping to prevent the model from becoming too complex. You could also try using simpler models or reducing the number of features to see if that helps improve the generalization performance of your models. (Matey) - Now I give the word to “Next”</a:t>
+              <a:t>F</a:t>
             </a:r>
-            <a:endParaRPr/>
+            <a:r>
+              <a:rPr lang="en" sz="1200" dirty="0">
+                <a:solidFill>
+                  <a:srgbClr val="D1D5DB"/>
+                </a:solidFill>
+                <a:highlight>
+                  <a:srgbClr val="444654"/>
+                </a:highlight>
+                <a:latin typeface="Roboto"/>
+                <a:ea typeface="Roboto"/>
+                <a:cs typeface="Roboto"/>
+                <a:sym typeface="Roboto"/>
+              </a:rPr>
+              <a:t>orm what the group experienced during execution of the assignment: </a:t>
+            </a:r>
+          </a:p>
+          <a:p>
+            <a:pPr marL="0" lvl="0" indent="0" algn="l" rtl="0">
+              <a:spcBef>
+                <a:spcPts val="0"/>
+              </a:spcBef>
+              <a:spcAft>
+                <a:spcPts val="0"/>
+              </a:spcAft>
+              <a:buNone/>
+            </a:pPr>
+            <a:r>
+              <a:rPr lang="en" sz="1200" dirty="0">
+                <a:solidFill>
+                  <a:srgbClr val="D1D5DB"/>
+                </a:solidFill>
+                <a:highlight>
+                  <a:srgbClr val="444654"/>
+                </a:highlight>
+                <a:latin typeface="Roboto"/>
+                <a:ea typeface="Roboto"/>
+                <a:cs typeface="Roboto"/>
+                <a:sym typeface="Roboto"/>
+              </a:rPr>
+              <a:t> the cleaning and preprocessing of the data was successful, as well as the implementation of normality tests and scaling of features. </a:t>
+            </a:r>
+          </a:p>
+          <a:p>
+            <a:pPr marL="0" lvl="0" indent="0" algn="l" rtl="0">
+              <a:spcBef>
+                <a:spcPts val="0"/>
+              </a:spcBef>
+              <a:spcAft>
+                <a:spcPts val="0"/>
+              </a:spcAft>
+              <a:buNone/>
+            </a:pPr>
+            <a:r>
+              <a:rPr lang="en" sz="1200" dirty="0">
+                <a:solidFill>
+                  <a:srgbClr val="D1D5DB"/>
+                </a:solidFill>
+                <a:highlight>
+                  <a:srgbClr val="444654"/>
+                </a:highlight>
+                <a:latin typeface="Roboto"/>
+                <a:ea typeface="Roboto"/>
+                <a:cs typeface="Roboto"/>
+                <a:sym typeface="Roboto"/>
+              </a:rPr>
+              <a:t>However, it appears that some of the models are overfitting, which means they are performing well on the training data but not as well on new or unseen data. This can happen when a model is too complex and has too many parameters, which can cause it to memorize the training data instead of learning the underlying patterns. To address this issue, the group tried using techniques to reduce overfitting, such as using early stop to prevent the model from becoming too complex and also tried using simpler models. We have tried as well reducing the number of features but we couldn’t succeed much in it. (Matey) - Now I give the word to “Next”</a:t>
+            </a:r>
+            <a:endParaRPr dirty="0"/>
           </a:p>
         </p:txBody>
       </p:sp>
@@ -1408,7 +1479,7 @@
         </p:nvSpPr>
         <p:spPr>
           <a:xfrm>
-            <a:off x="381300" y="685800"/>
+            <a:off x="381000" y="685800"/>
             <a:ext cx="6096000" cy="3429000"/>
           </a:xfrm>
           <a:custGeom>
@@ -7962,11 +8033,144 @@
           </a:p>
         </p:txBody>
       </p:sp>
+      <p:pic>
+        <p:nvPicPr>
+          <p:cNvPr id="6" name="Recorded Sound">
+            <a:hlinkClick r:id="" action="ppaction://media"/>
+            <a:extLst>
+              <a:ext uri="{FF2B5EF4-FFF2-40B4-BE49-F238E27FC236}">
+                <a16:creationId xmlns:a16="http://schemas.microsoft.com/office/drawing/2014/main" id="{7CF36F1F-46C6-7AEA-0E03-22308A03395F}"/>
+              </a:ext>
+            </a:extLst>
+          </p:cNvPr>
+          <p:cNvPicPr>
+            <a:picLocks noChangeAspect="1"/>
+          </p:cNvPicPr>
+          <p:nvPr>
+            <a:audioFile r:link="rId2"/>
+            <p:extLst>
+              <p:ext uri="{DAA4B4D4-6D71-4841-9C94-3DE7FCFB9230}">
+                <p14:media xmlns:p14="http://schemas.microsoft.com/office/powerpoint/2010/main" r:embed="rId1"/>
+              </p:ext>
+            </p:extLst>
+          </p:nvPr>
+        </p:nvPicPr>
+        <p:blipFill>
+          <a:blip r:embed="rId5"/>
+          <a:stretch>
+            <a:fillRect/>
+          </a:stretch>
+        </p:blipFill>
+        <p:spPr>
+          <a:xfrm>
+            <a:off x="8419323" y="4298975"/>
+            <a:ext cx="609600" cy="609600"/>
+          </a:xfrm>
+          <a:prstGeom prst="rect">
+            <a:avLst/>
+          </a:prstGeom>
+        </p:spPr>
+      </p:pic>
     </p:spTree>
   </p:cSld>
   <p:clrMapOvr>
     <a:masterClrMapping/>
   </p:clrMapOvr>
+  <mc:AlternateContent xmlns:mc="http://schemas.openxmlformats.org/markup-compatibility/2006">
+    <mc:Choice xmlns:p14="http://schemas.microsoft.com/office/powerpoint/2010/main" Requires="p14">
+      <p:transition spd="slow" p14:dur="2000" advTm="1101"/>
+    </mc:Choice>
+    <mc:Fallback>
+      <p:transition spd="slow" advTm="1101"/>
+    </mc:Fallback>
+  </mc:AlternateContent>
+  <p:timing>
+    <p:tnLst>
+      <p:par>
+        <p:cTn id="1" dur="indefinite" restart="never" nodeType="tmRoot">
+          <p:childTnLst>
+            <p:seq concurrent="1" nextAc="seek">
+              <p:cTn id="2" dur="indefinite" nodeType="mainSeq">
+                <p:childTnLst>
+                  <p:par>
+                    <p:cTn id="3" fill="hold">
+                      <p:stCondLst>
+                        <p:cond delay="indefinite"/>
+                        <p:cond evt="onBegin" delay="0">
+                          <p:tn val="2"/>
+                        </p:cond>
+                      </p:stCondLst>
+                      <p:childTnLst>
+                        <p:par>
+                          <p:cTn id="4" fill="hold">
+                            <p:stCondLst>
+                              <p:cond delay="0"/>
+                            </p:stCondLst>
+                            <p:childTnLst>
+                              <p:par>
+                                <p:cTn id="5" presetID="1" presetClass="mediacall" presetSubtype="0" fill="hold" nodeType="afterEffect">
+                                  <p:stCondLst>
+                                    <p:cond delay="0"/>
+                                  </p:stCondLst>
+                                  <p:childTnLst>
+                                    <p:cmd type="call" cmd="playFrom(0.0)">
+                                      <p:cBhvr>
+                                        <p:cTn id="6" dur="8810" fill="hold"/>
+                                        <p:tgtEl>
+                                          <p:spTgt spid="6"/>
+                                        </p:tgtEl>
+                                      </p:cBhvr>
+                                    </p:cmd>
+                                  </p:childTnLst>
+                                </p:cTn>
+                              </p:par>
+                            </p:childTnLst>
+                          </p:cTn>
+                        </p:par>
+                      </p:childTnLst>
+                    </p:cTn>
+                  </p:par>
+                </p:childTnLst>
+              </p:cTn>
+              <p:prevCondLst>
+                <p:cond evt="onPrev" delay="0">
+                  <p:tgtEl>
+                    <p:sldTgt/>
+                  </p:tgtEl>
+                </p:cond>
+              </p:prevCondLst>
+              <p:nextCondLst>
+                <p:cond evt="onNext" delay="0">
+                  <p:tgtEl>
+                    <p:sldTgt/>
+                  </p:tgtEl>
+                </p:cond>
+              </p:nextCondLst>
+            </p:seq>
+            <p:audio>
+              <p:cMediaNode vol="80000">
+                <p:cTn id="7" fill="hold" display="0">
+                  <p:stCondLst>
+                    <p:cond delay="indefinite"/>
+                  </p:stCondLst>
+                  <p:endCondLst>
+                    <p:cond evt="onStopAudio" delay="0">
+                      <p:tgtEl>
+                        <p:sldTgt/>
+                      </p:tgtEl>
+                    </p:cond>
+                  </p:endCondLst>
+                </p:cTn>
+                <p:tgtEl>
+                  <p:spTgt spid="6"/>
+                </p:tgtEl>
+              </p:cMediaNode>
+            </p:audio>
+          </p:childTnLst>
+        </p:cTn>
+      </p:par>
+    </p:tnLst>
+  </p:timing>
 </p:sld>
 </file>
 
@@ -8065,10 +8269,10 @@
               <a:buAutoNum type="arabicPeriod"/>
             </a:pPr>
             <a:r>
-              <a:rPr lang="en"/>
+              <a:rPr lang="en" dirty="0"/>
               <a:t>Understanding the problem and forming an objective</a:t>
             </a:r>
-            <a:endParaRPr/>
+            <a:endParaRPr dirty="0"/>
           </a:p>
           <a:p>
             <a:pPr marL="457200" lvl="0" indent="-311150" algn="l" rtl="0">
@@ -8082,10 +8286,10 @@
               <a:buAutoNum type="arabicPeriod"/>
             </a:pPr>
             <a:r>
-              <a:rPr lang="en"/>
-              <a:t>Why presented solution achieves the business objective</a:t>
+              <a:rPr lang="en" dirty="0"/>
+              <a:t>Why the group’s  solution achieves the business objective</a:t>
             </a:r>
-            <a:endParaRPr/>
+            <a:endParaRPr dirty="0"/>
           </a:p>
           <a:p>
             <a:pPr marL="457200" lvl="0" indent="-311150" algn="l" rtl="0">
@@ -8099,10 +8303,10 @@
               <a:buAutoNum type="arabicPeriod"/>
             </a:pPr>
             <a:r>
-              <a:rPr lang="en"/>
+              <a:rPr lang="en" dirty="0"/>
               <a:t>What worked and what did not </a:t>
             </a:r>
-            <a:endParaRPr/>
+            <a:endParaRPr dirty="0"/>
           </a:p>
           <a:p>
             <a:pPr marL="457200" lvl="0" indent="-311150" algn="l" rtl="0">
@@ -8116,18 +8320,151 @@
               <a:buAutoNum type="arabicPeriod"/>
             </a:pPr>
             <a:r>
-              <a:rPr lang="en"/>
+              <a:rPr lang="en" dirty="0"/>
               <a:t>Model’s limitations</a:t>
             </a:r>
-            <a:endParaRPr/>
+            <a:endParaRPr dirty="0"/>
           </a:p>
         </p:txBody>
       </p:sp>
+      <p:pic>
+        <p:nvPicPr>
+          <p:cNvPr id="3" name="Recorded Sound">
+            <a:hlinkClick r:id="" action="ppaction://media"/>
+            <a:extLst>
+              <a:ext uri="{FF2B5EF4-FFF2-40B4-BE49-F238E27FC236}">
+                <a16:creationId xmlns:a16="http://schemas.microsoft.com/office/drawing/2014/main" id="{4917EC3B-3086-0701-1D71-5820BCE957BE}"/>
+              </a:ext>
+            </a:extLst>
+          </p:cNvPr>
+          <p:cNvPicPr>
+            <a:picLocks noChangeAspect="1"/>
+          </p:cNvPicPr>
+          <p:nvPr>
+            <a:audioFile r:link="rId2"/>
+            <p:extLst>
+              <p:ext uri="{DAA4B4D4-6D71-4841-9C94-3DE7FCFB9230}">
+                <p14:media xmlns:p14="http://schemas.microsoft.com/office/powerpoint/2010/main" r:embed="rId1"/>
+              </p:ext>
+            </p:extLst>
+          </p:nvPr>
+        </p:nvPicPr>
+        <p:blipFill>
+          <a:blip r:embed="rId5"/>
+          <a:stretch>
+            <a:fillRect/>
+          </a:stretch>
+        </p:blipFill>
+        <p:spPr>
+          <a:xfrm>
+            <a:off x="217715" y="4450314"/>
+            <a:ext cx="609600" cy="609600"/>
+          </a:xfrm>
+          <a:prstGeom prst="rect">
+            <a:avLst/>
+          </a:prstGeom>
+        </p:spPr>
+      </p:pic>
     </p:spTree>
   </p:cSld>
   <p:clrMapOvr>
     <a:masterClrMapping/>
   </p:clrMapOvr>
+  <mc:AlternateContent xmlns:mc="http://schemas.openxmlformats.org/markup-compatibility/2006">
+    <mc:Choice xmlns:p14="http://schemas.microsoft.com/office/powerpoint/2010/main" Requires="p14">
+      <p:transition spd="slow" p14:dur="2000" advTm="14847"/>
+    </mc:Choice>
+    <mc:Fallback>
+      <p:transition spd="slow" advTm="14847"/>
+    </mc:Fallback>
+  </mc:AlternateContent>
+  <p:timing>
+    <p:tnLst>
+      <p:par>
+        <p:cTn id="1" dur="indefinite" restart="never" nodeType="tmRoot">
+          <p:childTnLst>
+            <p:seq concurrent="1" nextAc="seek">
+              <p:cTn id="2" dur="indefinite" nodeType="mainSeq">
+                <p:childTnLst>
+                  <p:par>
+                    <p:cTn id="3" fill="hold">
+                      <p:stCondLst>
+                        <p:cond delay="indefinite"/>
+                        <p:cond evt="onBegin" delay="0">
+                          <p:tn val="2"/>
+                        </p:cond>
+                      </p:stCondLst>
+                      <p:childTnLst>
+                        <p:par>
+                          <p:cTn id="4" fill="hold">
+                            <p:stCondLst>
+                              <p:cond delay="0"/>
+                            </p:stCondLst>
+                            <p:childTnLst>
+                              <p:par>
+                                <p:cTn id="5" presetID="1" presetClass="mediacall" presetSubtype="0" fill="hold" nodeType="afterEffect">
+                                  <p:stCondLst>
+                                    <p:cond delay="0"/>
+                                  </p:stCondLst>
+                                  <p:childTnLst>
+                                    <p:cmd type="call" cmd="playFrom(0.0)">
+                                      <p:cBhvr>
+                                        <p:cTn id="6" dur="14847" fill="hold"/>
+                                        <p:tgtEl>
+                                          <p:spTgt spid="3"/>
+                                        </p:tgtEl>
+                                      </p:cBhvr>
+                                    </p:cmd>
+                                  </p:childTnLst>
+                                </p:cTn>
+                              </p:par>
+                            </p:childTnLst>
+                          </p:cTn>
+                        </p:par>
+                      </p:childTnLst>
+                    </p:cTn>
+                  </p:par>
+                </p:childTnLst>
+              </p:cTn>
+              <p:prevCondLst>
+                <p:cond evt="onPrev" delay="0">
+                  <p:tgtEl>
+                    <p:sldTgt/>
+                  </p:tgtEl>
+                </p:cond>
+              </p:prevCondLst>
+              <p:nextCondLst>
+                <p:cond evt="onNext" delay="0">
+                  <p:tgtEl>
+                    <p:sldTgt/>
+                  </p:tgtEl>
+                </p:cond>
+              </p:nextCondLst>
+            </p:seq>
+            <p:audio>
+              <p:cMediaNode vol="80000">
+                <p:cTn id="7" fill="hold" display="0">
+                  <p:stCondLst>
+                    <p:cond delay="indefinite"/>
+                  </p:stCondLst>
+                  <p:endCondLst>
+                    <p:cond evt="onStopAudio" delay="0">
+                      <p:tgtEl>
+                        <p:sldTgt/>
+                      </p:tgtEl>
+                    </p:cond>
+                  </p:endCondLst>
+                </p:cTn>
+                <p:tgtEl>
+                  <p:spTgt spid="3"/>
+                </p:tgtEl>
+              </p:cMediaNode>
+            </p:audio>
+          </p:childTnLst>
+        </p:cTn>
+      </p:par>
+    </p:tnLst>
+  </p:timing>
 </p:sld>
 </file>
 
@@ -8248,11 +8585,144 @@
           </a:p>
         </p:txBody>
       </p:sp>
+      <p:pic>
+        <p:nvPicPr>
+          <p:cNvPr id="4" name="Recorded Sound">
+            <a:hlinkClick r:id="" action="ppaction://media"/>
+            <a:extLst>
+              <a:ext uri="{FF2B5EF4-FFF2-40B4-BE49-F238E27FC236}">
+                <a16:creationId xmlns:a16="http://schemas.microsoft.com/office/drawing/2014/main" id="{AB05CF7B-2D4A-E29C-AE6E-B483AB1B69CA}"/>
+              </a:ext>
+            </a:extLst>
+          </p:cNvPr>
+          <p:cNvPicPr>
+            <a:picLocks noChangeAspect="1"/>
+          </p:cNvPicPr>
+          <p:nvPr>
+            <a:audioFile r:link="rId2"/>
+            <p:extLst>
+              <p:ext uri="{DAA4B4D4-6D71-4841-9C94-3DE7FCFB9230}">
+                <p14:media xmlns:p14="http://schemas.microsoft.com/office/powerpoint/2010/main" r:embed="rId1"/>
+              </p:ext>
+            </p:extLst>
+          </p:nvPr>
+        </p:nvPicPr>
+        <p:blipFill>
+          <a:blip r:embed="rId5"/>
+          <a:stretch>
+            <a:fillRect/>
+          </a:stretch>
+        </p:blipFill>
+        <p:spPr>
+          <a:xfrm>
+            <a:off x="236375" y="4422321"/>
+            <a:ext cx="609600" cy="609600"/>
+          </a:xfrm>
+          <a:prstGeom prst="rect">
+            <a:avLst/>
+          </a:prstGeom>
+        </p:spPr>
+      </p:pic>
     </p:spTree>
   </p:cSld>
   <p:clrMapOvr>
     <a:masterClrMapping/>
   </p:clrMapOvr>
+  <mc:AlternateContent xmlns:mc="http://schemas.openxmlformats.org/markup-compatibility/2006">
+    <mc:Choice xmlns:p14="http://schemas.microsoft.com/office/powerpoint/2010/main" Requires="p14">
+      <p:transition spd="slow" p14:dur="2000" advTm="24925"/>
+    </mc:Choice>
+    <mc:Fallback>
+      <p:transition spd="slow" advTm="24925"/>
+    </mc:Fallback>
+  </mc:AlternateContent>
+  <p:timing>
+    <p:tnLst>
+      <p:par>
+        <p:cTn id="1" dur="indefinite" restart="never" nodeType="tmRoot">
+          <p:childTnLst>
+            <p:seq concurrent="1" nextAc="seek">
+              <p:cTn id="2" dur="indefinite" nodeType="mainSeq">
+                <p:childTnLst>
+                  <p:par>
+                    <p:cTn id="3" fill="hold">
+                      <p:stCondLst>
+                        <p:cond delay="indefinite"/>
+                        <p:cond evt="onBegin" delay="0">
+                          <p:tn val="2"/>
+                        </p:cond>
+                      </p:stCondLst>
+                      <p:childTnLst>
+                        <p:par>
+                          <p:cTn id="4" fill="hold">
+                            <p:stCondLst>
+                              <p:cond delay="0"/>
+                            </p:stCondLst>
+                            <p:childTnLst>
+                              <p:par>
+                                <p:cTn id="5" presetID="1" presetClass="mediacall" presetSubtype="0" fill="hold" nodeType="afterEffect">
+                                  <p:stCondLst>
+                                    <p:cond delay="0"/>
+                                  </p:stCondLst>
+                                  <p:childTnLst>
+                                    <p:cmd type="call" cmd="playFrom(0.0)">
+                                      <p:cBhvr>
+                                        <p:cTn id="6" dur="24925" fill="hold"/>
+                                        <p:tgtEl>
+                                          <p:spTgt spid="4"/>
+                                        </p:tgtEl>
+                                      </p:cBhvr>
+                                    </p:cmd>
+                                  </p:childTnLst>
+                                </p:cTn>
+                              </p:par>
+                            </p:childTnLst>
+                          </p:cTn>
+                        </p:par>
+                      </p:childTnLst>
+                    </p:cTn>
+                  </p:par>
+                </p:childTnLst>
+              </p:cTn>
+              <p:prevCondLst>
+                <p:cond evt="onPrev" delay="0">
+                  <p:tgtEl>
+                    <p:sldTgt/>
+                  </p:tgtEl>
+                </p:cond>
+              </p:prevCondLst>
+              <p:nextCondLst>
+                <p:cond evt="onNext" delay="0">
+                  <p:tgtEl>
+                    <p:sldTgt/>
+                  </p:tgtEl>
+                </p:cond>
+              </p:nextCondLst>
+            </p:seq>
+            <p:audio>
+              <p:cMediaNode vol="80000">
+                <p:cTn id="7" fill="hold" display="0">
+                  <p:stCondLst>
+                    <p:cond delay="indefinite"/>
+                  </p:stCondLst>
+                  <p:endCondLst>
+                    <p:cond evt="onStopAudio" delay="0">
+                      <p:tgtEl>
+                        <p:sldTgt/>
+                      </p:tgtEl>
+                    </p:cond>
+                  </p:endCondLst>
+                </p:cTn>
+                <p:tgtEl>
+                  <p:spTgt spid="4"/>
+                </p:tgtEl>
+              </p:cMediaNode>
+            </p:audio>
+          </p:childTnLst>
+        </p:cTn>
+      </p:par>
+    </p:tnLst>
+  </p:timing>
 </p:sld>
 </file>
 
@@ -8401,11 +8871,146 @@
           </a:p>
         </p:txBody>
       </p:sp>
+      <p:pic>
+        <p:nvPicPr>
+          <p:cNvPr id="7" name="Recorded Sound">
+            <a:hlinkClick r:id="" action="ppaction://media"/>
+            <a:extLst>
+              <a:ext uri="{FF2B5EF4-FFF2-40B4-BE49-F238E27FC236}">
+                <a16:creationId xmlns:a16="http://schemas.microsoft.com/office/drawing/2014/main" id="{AAA8D6FB-68FE-B089-E59E-9D51E064F0E5}"/>
+              </a:ext>
+            </a:extLst>
+          </p:cNvPr>
+          <p:cNvPicPr>
+            <a:picLocks noChangeAspect="1"/>
+          </p:cNvPicPr>
+          <p:nvPr>
+            <a:audioFile r:link="rId1"/>
+            <p:extLst>
+              <p:ext uri="{DAA4B4D4-6D71-4841-9C94-3DE7FCFB9230}">
+                <p14:media xmlns:p14="http://schemas.microsoft.com/office/powerpoint/2010/main" r:embed="rId2">
+                  <p14:trim end="2745.6507"/>
+                </p14:media>
+              </p:ext>
+            </p:extLst>
+          </p:nvPr>
+        </p:nvPicPr>
+        <p:blipFill>
+          <a:blip r:embed="rId5"/>
+          <a:stretch>
+            <a:fillRect/>
+          </a:stretch>
+        </p:blipFill>
+        <p:spPr>
+          <a:xfrm>
+            <a:off x="161730" y="4474417"/>
+            <a:ext cx="609600" cy="609600"/>
+          </a:xfrm>
+          <a:prstGeom prst="rect">
+            <a:avLst/>
+          </a:prstGeom>
+        </p:spPr>
+      </p:pic>
     </p:spTree>
   </p:cSld>
   <p:clrMapOvr>
     <a:masterClrMapping/>
   </p:clrMapOvr>
+  <mc:AlternateContent xmlns:mc="http://schemas.openxmlformats.org/markup-compatibility/2006">
+    <mc:Choice xmlns:p14="http://schemas.microsoft.com/office/powerpoint/2010/main" Requires="p14">
+      <p:transition spd="slow" p14:dur="2000" advTm="11991"/>
+    </mc:Choice>
+    <mc:Fallback>
+      <p:transition spd="slow" advTm="11991"/>
+    </mc:Fallback>
+  </mc:AlternateContent>
+  <p:timing>
+    <p:tnLst>
+      <p:par>
+        <p:cTn id="1" dur="indefinite" restart="never" nodeType="tmRoot">
+          <p:childTnLst>
+            <p:seq concurrent="1" nextAc="seek">
+              <p:cTn id="2" dur="indefinite" nodeType="mainSeq">
+                <p:childTnLst>
+                  <p:par>
+                    <p:cTn id="3" fill="hold">
+                      <p:stCondLst>
+                        <p:cond delay="indefinite"/>
+                        <p:cond evt="onBegin" delay="0">
+                          <p:tn val="2"/>
+                        </p:cond>
+                      </p:stCondLst>
+                      <p:childTnLst>
+                        <p:par>
+                          <p:cTn id="4" fill="hold">
+                            <p:stCondLst>
+                              <p:cond delay="0"/>
+                            </p:stCondLst>
+                            <p:childTnLst>
+                              <p:par>
+                                <p:cTn id="5" presetID="1" presetClass="mediacall" presetSubtype="0" fill="hold" nodeType="afterEffect">
+                                  <p:stCondLst>
+                                    <p:cond delay="0"/>
+                                  </p:stCondLst>
+                                  <p:childTnLst>
+                                    <p:cmd type="call" cmd="playFrom(0.0)">
+                                      <p:cBhvr>
+                                        <p:cTn id="6" dur="27938" fill="hold"/>
+                                        <p:tgtEl>
+                                          <p:spTgt spid="7"/>
+                                        </p:tgtEl>
+                                      </p:cBhvr>
+                                    </p:cmd>
+                                  </p:childTnLst>
+                                </p:cTn>
+                              </p:par>
+                            </p:childTnLst>
+                          </p:cTn>
+                        </p:par>
+                      </p:childTnLst>
+                    </p:cTn>
+                  </p:par>
+                </p:childTnLst>
+              </p:cTn>
+              <p:prevCondLst>
+                <p:cond evt="onPrev" delay="0">
+                  <p:tgtEl>
+                    <p:sldTgt/>
+                  </p:tgtEl>
+                </p:cond>
+              </p:prevCondLst>
+              <p:nextCondLst>
+                <p:cond evt="onNext" delay="0">
+                  <p:tgtEl>
+                    <p:sldTgt/>
+                  </p:tgtEl>
+                </p:cond>
+              </p:nextCondLst>
+            </p:seq>
+            <p:audio>
+              <p:cMediaNode vol="80000">
+                <p:cTn id="7" fill="hold" display="0">
+                  <p:stCondLst>
+                    <p:cond delay="indefinite"/>
+                  </p:stCondLst>
+                  <p:endCondLst>
+                    <p:cond evt="onStopAudio" delay="0">
+                      <p:tgtEl>
+                        <p:sldTgt/>
+                      </p:tgtEl>
+                    </p:cond>
+                  </p:endCondLst>
+                </p:cTn>
+                <p:tgtEl>
+                  <p:spTgt spid="7"/>
+                </p:tgtEl>
+              </p:cMediaNode>
+            </p:audio>
+          </p:childTnLst>
+        </p:cTn>
+      </p:par>
+    </p:tnLst>
+  </p:timing>
 </p:sld>
 </file>
 
@@ -8661,44 +9266,6 @@
           </a:p>
         </p:txBody>
       </p:sp>
-      <p:sp>
-        <p:nvSpPr>
-          <p:cNvPr id="98" name="Google Shape;98;p18"/>
-          <p:cNvSpPr txBox="1">
-            <a:spLocks noGrp="1"/>
-          </p:cNvSpPr>
-          <p:nvPr>
-            <p:ph type="body" idx="1"/>
-          </p:nvPr>
-        </p:nvSpPr>
-        <p:spPr>
-          <a:xfrm>
-            <a:off x="4644675" y="500925"/>
-            <a:ext cx="4166400" cy="4098600"/>
-          </a:xfrm>
-          <a:prstGeom prst="rect">
-            <a:avLst/>
-          </a:prstGeom>
-        </p:spPr>
-        <p:txBody>
-          <a:bodyPr spcFirstLastPara="1" wrap="square" lIns="91425" tIns="91425" rIns="91425" bIns="91425" anchor="t" anchorCtr="0">
-            <a:normAutofit/>
-          </a:bodyPr>
-          <a:lstStyle/>
-          <a:p>
-            <a:pPr marL="0" lvl="0" indent="0" algn="l" rtl="0">
-              <a:spcBef>
-                <a:spcPts val="0"/>
-              </a:spcBef>
-              <a:spcAft>
-                <a:spcPts val="1200"/>
-              </a:spcAft>
-              <a:buNone/>
-            </a:pPr>
-            <a:endParaRPr/>
-          </a:p>
-        </p:txBody>
-      </p:sp>
       <p:pic>
         <p:nvPicPr>
           <p:cNvPr id="99" name="Google Shape;99;p18"/>
@@ -8706,7 +9273,7 @@
           <p:nvPr/>
         </p:nvPicPr>
         <p:blipFill>
-          <a:blip r:embed="rId3">
+          <a:blip r:embed="rId5">
             <a:alphaModFix/>
           </a:blip>
           <a:stretch>
@@ -8734,7 +9301,7 @@
           <p:nvPr/>
         </p:nvPicPr>
         <p:blipFill>
-          <a:blip r:embed="rId4">
+          <a:blip r:embed="rId6">
             <a:alphaModFix/>
           </a:blip>
           <a:stretch>
@@ -8762,7 +9329,7 @@
           <p:nvPr/>
         </p:nvPicPr>
         <p:blipFill>
-          <a:blip r:embed="rId5">
+          <a:blip r:embed="rId7">
             <a:alphaModFix/>
           </a:blip>
           <a:stretch>
@@ -8790,7 +9357,7 @@
           <p:nvPr/>
         </p:nvPicPr>
         <p:blipFill>
-          <a:blip r:embed="rId6">
+          <a:blip r:embed="rId8">
             <a:alphaModFix/>
           </a:blip>
           <a:stretch>
@@ -8811,11 +9378,144 @@
           </a:ln>
         </p:spPr>
       </p:pic>
+      <p:pic>
+        <p:nvPicPr>
+          <p:cNvPr id="2" name="Recorded Sound">
+            <a:hlinkClick r:id="" action="ppaction://media"/>
+            <a:extLst>
+              <a:ext uri="{FF2B5EF4-FFF2-40B4-BE49-F238E27FC236}">
+                <a16:creationId xmlns:a16="http://schemas.microsoft.com/office/drawing/2014/main" id="{397F2DFA-D0C5-ED41-CFBE-18B63725B9A9}"/>
+              </a:ext>
+            </a:extLst>
+          </p:cNvPr>
+          <p:cNvPicPr>
+            <a:picLocks noChangeAspect="1"/>
+          </p:cNvPicPr>
+          <p:nvPr>
+            <a:audioFile r:link="rId2"/>
+            <p:extLst>
+              <p:ext uri="{DAA4B4D4-6D71-4841-9C94-3DE7FCFB9230}">
+                <p14:media xmlns:p14="http://schemas.microsoft.com/office/powerpoint/2010/main" r:embed="rId1"/>
+              </p:ext>
+            </p:extLst>
+          </p:nvPr>
+        </p:nvPicPr>
+        <p:blipFill>
+          <a:blip r:embed="rId9"/>
+          <a:stretch>
+            <a:fillRect/>
+          </a:stretch>
+        </p:blipFill>
+        <p:spPr>
+          <a:xfrm>
+            <a:off x="184250" y="2107725"/>
+            <a:ext cx="609600" cy="609600"/>
+          </a:xfrm>
+          <a:prstGeom prst="rect">
+            <a:avLst/>
+          </a:prstGeom>
+        </p:spPr>
+      </p:pic>
     </p:spTree>
   </p:cSld>
   <p:clrMapOvr>
     <a:masterClrMapping/>
   </p:clrMapOvr>
+  <mc:AlternateContent xmlns:mc="http://schemas.openxmlformats.org/markup-compatibility/2006">
+    <mc:Choice xmlns:p14="http://schemas.microsoft.com/office/powerpoint/2010/main" Requires="p14">
+      <p:transition spd="slow" p14:dur="2000" advTm="52161"/>
+    </mc:Choice>
+    <mc:Fallback>
+      <p:transition spd="slow" advTm="52161"/>
+    </mc:Fallback>
+  </mc:AlternateContent>
+  <p:timing>
+    <p:tnLst>
+      <p:par>
+        <p:cTn id="1" dur="indefinite" restart="never" nodeType="tmRoot">
+          <p:childTnLst>
+            <p:seq concurrent="1" nextAc="seek">
+              <p:cTn id="2" dur="indefinite" nodeType="mainSeq">
+                <p:childTnLst>
+                  <p:par>
+                    <p:cTn id="3" fill="hold">
+                      <p:stCondLst>
+                        <p:cond delay="indefinite"/>
+                        <p:cond evt="onBegin" delay="0">
+                          <p:tn val="2"/>
+                        </p:cond>
+                      </p:stCondLst>
+                      <p:childTnLst>
+                        <p:par>
+                          <p:cTn id="4" fill="hold">
+                            <p:stCondLst>
+                              <p:cond delay="0"/>
+                            </p:stCondLst>
+                            <p:childTnLst>
+                              <p:par>
+                                <p:cTn id="5" presetID="1" presetClass="mediacall" presetSubtype="0" fill="hold" nodeType="afterEffect">
+                                  <p:stCondLst>
+                                    <p:cond delay="0"/>
+                                  </p:stCondLst>
+                                  <p:childTnLst>
+                                    <p:cmd type="call" cmd="playFrom(0.0)">
+                                      <p:cBhvr>
+                                        <p:cTn id="6" dur="52161" fill="hold"/>
+                                        <p:tgtEl>
+                                          <p:spTgt spid="2"/>
+                                        </p:tgtEl>
+                                      </p:cBhvr>
+                                    </p:cmd>
+                                  </p:childTnLst>
+                                </p:cTn>
+                              </p:par>
+                            </p:childTnLst>
+                          </p:cTn>
+                        </p:par>
+                      </p:childTnLst>
+                    </p:cTn>
+                  </p:par>
+                </p:childTnLst>
+              </p:cTn>
+              <p:prevCondLst>
+                <p:cond evt="onPrev" delay="0">
+                  <p:tgtEl>
+                    <p:sldTgt/>
+                  </p:tgtEl>
+                </p:cond>
+              </p:prevCondLst>
+              <p:nextCondLst>
+                <p:cond evt="onNext" delay="0">
+                  <p:tgtEl>
+                    <p:sldTgt/>
+                  </p:tgtEl>
+                </p:cond>
+              </p:nextCondLst>
+            </p:seq>
+            <p:audio>
+              <p:cMediaNode vol="80000">
+                <p:cTn id="7" fill="hold" display="0">
+                  <p:stCondLst>
+                    <p:cond delay="indefinite"/>
+                  </p:stCondLst>
+                  <p:endCondLst>
+                    <p:cond evt="onStopAudio" delay="0">
+                      <p:tgtEl>
+                        <p:sldTgt/>
+                      </p:tgtEl>
+                    </p:cond>
+                  </p:endCondLst>
+                </p:cTn>
+                <p:tgtEl>
+                  <p:spTgt spid="2"/>
+                </p:tgtEl>
+              </p:cMediaNode>
+            </p:audio>
+          </p:childTnLst>
+        </p:cTn>
+      </p:par>
+    </p:tnLst>
+  </p:timing>
 </p:sld>
 </file>
 
@@ -8899,7 +9599,7 @@
         </p:spPr>
         <p:txBody>
           <a:bodyPr spcFirstLastPara="1" wrap="square" lIns="91425" tIns="91425" rIns="91425" bIns="91425" anchor="t" anchorCtr="0">
-            <a:normAutofit lnSpcReduction="20000"/>
+            <a:normAutofit/>
           </a:bodyPr>
           <a:lstStyle/>
           <a:p>

</xml_diff>